<commit_message>
Fixed some small mistakes
</commit_message>
<xml_diff>
--- a/3.pptx
+++ b/3.pptx
@@ -643,6 +643,90 @@
           <a:p>
             <a:fld id="{AB7A67D8-81A2-4C40-907D-EC4BC1D9B23E}" type="slidenum">
               <a:rPr lang="en-GB" smtClean="0"/>
+              <a:t>9</a:t>
+            </a:fld>
+            <a:endParaRPr lang="en-GB"/>
+          </a:p>
+        </p:txBody>
+      </p:sp>
+    </p:spTree>
+    <p:extLst>
+      <p:ext uri="{BB962C8B-B14F-4D97-AF65-F5344CB8AC3E}">
+        <p14:creationId xmlns:p14="http://schemas.microsoft.com/office/powerpoint/2010/main" val="1063903876"/>
+      </p:ext>
+    </p:extLst>
+  </p:cSld>
+  <p:clrMapOvr>
+    <a:masterClrMapping/>
+  </p:clrMapOvr>
+</p:notes>
+</file>
+
+<file path=ppt/notesSlides/notesSlide3.xml><?xml version="1.0" encoding="utf-8"?>
+<p:notes xmlns:a="http://schemas.openxmlformats.org/drawingml/2006/main" xmlns:r="http://schemas.openxmlformats.org/officeDocument/2006/relationships" xmlns:p="http://schemas.openxmlformats.org/presentationml/2006/main">
+  <p:cSld>
+    <p:spTree>
+      <p:nvGrpSpPr>
+        <p:cNvPr id="1" name=""/>
+        <p:cNvGrpSpPr/>
+        <p:nvPr/>
+      </p:nvGrpSpPr>
+      <p:grpSpPr>
+        <a:xfrm>
+          <a:off x="0" y="0"/>
+          <a:ext cx="0" cy="0"/>
+          <a:chOff x="0" y="0"/>
+          <a:chExt cx="0" cy="0"/>
+        </a:xfrm>
+      </p:grpSpPr>
+      <p:sp>
+        <p:nvSpPr>
+          <p:cNvPr id="2" name="Diakép helye 1"/>
+          <p:cNvSpPr>
+            <a:spLocks noGrp="1" noRot="1" noChangeAspect="1"/>
+          </p:cNvSpPr>
+          <p:nvPr>
+            <p:ph type="sldImg"/>
+          </p:nvPr>
+        </p:nvSpPr>
+        <p:spPr/>
+      </p:sp>
+      <p:sp>
+        <p:nvSpPr>
+          <p:cNvPr id="3" name="Jegyzetek helye 2"/>
+          <p:cNvSpPr>
+            <a:spLocks noGrp="1"/>
+          </p:cNvSpPr>
+          <p:nvPr>
+            <p:ph type="body" idx="1"/>
+          </p:nvPr>
+        </p:nvSpPr>
+        <p:spPr/>
+        <p:txBody>
+          <a:bodyPr/>
+          <a:lstStyle/>
+          <a:p>
+            <a:endParaRPr lang="en-GB" dirty="0"/>
+          </a:p>
+        </p:txBody>
+      </p:sp>
+      <p:sp>
+        <p:nvSpPr>
+          <p:cNvPr id="4" name="Dia számának helye 3"/>
+          <p:cNvSpPr>
+            <a:spLocks noGrp="1"/>
+          </p:cNvSpPr>
+          <p:nvPr>
+            <p:ph type="sldNum" sz="quarter" idx="10"/>
+          </p:nvPr>
+        </p:nvSpPr>
+        <p:spPr/>
+        <p:txBody>
+          <a:bodyPr/>
+          <a:lstStyle/>
+          <a:p>
+            <a:fld id="{AB7A67D8-81A2-4C40-907D-EC4BC1D9B23E}" type="slidenum">
+              <a:rPr lang="en-GB" smtClean="0"/>
               <a:t>19</a:t>
             </a:fld>
             <a:endParaRPr lang="en-GB"/>
@@ -662,7 +746,7 @@
 </p:notes>
 </file>
 
-<file path=ppt/notesSlides/notesSlide3.xml><?xml version="1.0" encoding="utf-8"?>
+<file path=ppt/notesSlides/notesSlide4.xml><?xml version="1.0" encoding="utf-8"?>
 <p:notes xmlns:a="http://schemas.openxmlformats.org/drawingml/2006/main" xmlns:r="http://schemas.openxmlformats.org/officeDocument/2006/relationships" xmlns:p="http://schemas.openxmlformats.org/presentationml/2006/main">
   <p:cSld>
     <p:spTree>
@@ -19844,15 +19928,9 @@
               <a:rPr lang="en-GB" dirty="0"/>
               <a:t>This only provides a good solution for classification problems where the classes are </a:t>
             </a:r>
-          </a:p>
-          <a:p>
-            <a:r>
-              <a:rPr lang="en-GB" b="1" dirty="0"/>
-              <a:t>linearly </a:t>
-            </a:r>
             <a:r>
               <a:rPr lang="en-GB" b="1" dirty="0" smtClean="0"/>
-              <a:t>separable</a:t>
+              <a:t>linearly separable</a:t>
             </a:r>
             <a:r>
               <a:rPr lang="hu-HU" dirty="0" smtClean="0"/>

</xml_diff>